<commit_message>
uploaded working pipeline with extra figure making scripts, and a Forrest_Wrapper to troubleshoot transprob problems
</commit_message>
<xml_diff>
--- a/Documents/Poster/OHBM_poster_091125_KW.pptx
+++ b/Documents/Poster/OHBM_poster_091125_KW.pptx
@@ -6190,7 +6190,7 @@
         <p:spPr>
           <a:xfrm>
             <a:off x="16029141" y="38545292"/>
-            <a:ext cx="12300612" cy="3385542"/>
+            <a:ext cx="12300612" cy="3754874"/>
           </a:xfrm>
           <a:prstGeom prst="rect">
             <a:avLst/>
@@ -6451,10 +6451,12 @@
             </a:r>
           </a:p>
           <a:p>
-            <a:pPr algn="just"/>
+            <a:pPr marL="228600" indent="-228600" algn="just">
+              <a:buAutoNum type="arabicPeriod" startAt="10"/>
+            </a:pPr>
             <a:r>
               <a:rPr lang="en-AU" sz="1200" dirty="0"/>
-              <a:t>10.	</a:t>
+              <a:t>                </a:t>
             </a:r>
             <a:r>
               <a:rPr lang="en-AU" sz="1200" dirty="0" err="1"/>
@@ -6482,10 +6484,134 @@
             </a:r>
           </a:p>
           <a:p>
+            <a:pPr marL="228600" indent="-228600" algn="just">
+              <a:buFontTx/>
+              <a:buAutoNum type="arabicPeriod" startAt="10"/>
+            </a:pPr>
+            <a:r>
+              <a:rPr lang="en-US" altLang="en-US" sz="1200" dirty="0">
+                <a:solidFill>
+                  <a:srgbClr val="1B1B1B"/>
+                </a:solidFill>
+                <a:ea typeface="Roboto Mono Web"/>
+              </a:rPr>
+              <a:t>                Yeo BT, </a:t>
+            </a:r>
+            <a:r>
+              <a:rPr lang="en-US" altLang="en-US" sz="1200" dirty="0" err="1">
+                <a:solidFill>
+                  <a:srgbClr val="1B1B1B"/>
+                </a:solidFill>
+                <a:ea typeface="Roboto Mono Web"/>
+              </a:rPr>
+              <a:t>Krienen</a:t>
+            </a:r>
+            <a:r>
+              <a:rPr lang="en-US" altLang="en-US" sz="1200" dirty="0">
+                <a:solidFill>
+                  <a:srgbClr val="1B1B1B"/>
+                </a:solidFill>
+                <a:ea typeface="Roboto Mono Web"/>
+              </a:rPr>
+              <a:t> FM, </a:t>
+            </a:r>
+            <a:r>
+              <a:rPr lang="en-US" altLang="en-US" sz="1200" dirty="0" err="1">
+                <a:solidFill>
+                  <a:srgbClr val="1B1B1B"/>
+                </a:solidFill>
+                <a:ea typeface="Roboto Mono Web"/>
+              </a:rPr>
+              <a:t>Sepulcre</a:t>
+            </a:r>
+            <a:r>
+              <a:rPr lang="en-US" altLang="en-US" sz="1200" dirty="0">
+                <a:solidFill>
+                  <a:srgbClr val="1B1B1B"/>
+                </a:solidFill>
+                <a:ea typeface="Roboto Mono Web"/>
+              </a:rPr>
+              <a:t> J, </a:t>
+            </a:r>
+            <a:r>
+              <a:rPr lang="en-US" altLang="en-US" sz="1200" dirty="0" err="1">
+                <a:solidFill>
+                  <a:srgbClr val="1B1B1B"/>
+                </a:solidFill>
+                <a:ea typeface="Roboto Mono Web"/>
+              </a:rPr>
+              <a:t>Sabuncu</a:t>
+            </a:r>
+            <a:r>
+              <a:rPr lang="en-US" altLang="en-US" sz="1200" dirty="0">
+                <a:solidFill>
+                  <a:srgbClr val="1B1B1B"/>
+                </a:solidFill>
+                <a:ea typeface="Roboto Mono Web"/>
+              </a:rPr>
+              <a:t> MR, Lashkari D, Hollinshead M, Roffman JL, Smoller JW, </a:t>
+            </a:r>
+            <a:r>
+              <a:rPr lang="en-US" altLang="en-US" sz="1200" dirty="0" err="1">
+                <a:solidFill>
+                  <a:srgbClr val="1B1B1B"/>
+                </a:solidFill>
+                <a:ea typeface="Roboto Mono Web"/>
+              </a:rPr>
+              <a:t>Zöllei</a:t>
+            </a:r>
+            <a:r>
+              <a:rPr lang="en-US" altLang="en-US" sz="1200" dirty="0">
+                <a:solidFill>
+                  <a:srgbClr val="1B1B1B"/>
+                </a:solidFill>
+                <a:ea typeface="Roboto Mono Web"/>
+              </a:rPr>
+              <a:t> L, Polimeni JR, Fischl B, Liu H, Buckner RL. The 	organization of the human cerebral cortex estimated by intrinsic functional connectivity. J </a:t>
+            </a:r>
+            <a:r>
+              <a:rPr lang="en-US" altLang="en-US" sz="1200" dirty="0" err="1">
+                <a:solidFill>
+                  <a:srgbClr val="1B1B1B"/>
+                </a:solidFill>
+                <a:ea typeface="Roboto Mono Web"/>
+              </a:rPr>
+              <a:t>Neurophysiol</a:t>
+            </a:r>
+            <a:r>
+              <a:rPr lang="en-US" altLang="en-US" sz="1200" dirty="0">
+                <a:solidFill>
+                  <a:srgbClr val="1B1B1B"/>
+                </a:solidFill>
+                <a:ea typeface="Roboto Mono Web"/>
+              </a:rPr>
+              <a:t>. 2011. </a:t>
+            </a:r>
+            <a:r>
+              <a:rPr lang="en-US" altLang="en-US" sz="1200" b="1" dirty="0">
+                <a:solidFill>
+                  <a:srgbClr val="1B1B1B"/>
+                </a:solidFill>
+                <a:ea typeface="Roboto Mono Web"/>
+              </a:rPr>
+              <a:t>106</a:t>
+            </a:r>
+            <a:r>
+              <a:rPr lang="en-US" altLang="en-US" sz="1200" dirty="0">
+                <a:solidFill>
+                  <a:srgbClr val="1B1B1B"/>
+                </a:solidFill>
+                <a:ea typeface="Roboto Mono Web"/>
+              </a:rPr>
+              <a:t>(3): p. 1125-65.</a:t>
+            </a:r>
+            <a:endParaRPr lang="en-AU" sz="1200" dirty="0"/>
+          </a:p>
+          <a:p>
             <a:pPr algn="just"/>
             <a:r>
               <a:rPr lang="en-AU" sz="1200" dirty="0"/>
-              <a:t>11.	Vidaurre, D., et al., </a:t>
+              <a:t>12.	Vidaurre, D., et al., </a:t>
             </a:r>
             <a:r>
               <a:rPr lang="en-AU" sz="1200" i="1" dirty="0"/>
@@ -8967,7 +9093,7 @@
         <p:spPr>
           <a:xfrm>
             <a:off x="15667752" y="4525178"/>
-            <a:ext cx="12919806" cy="9109930"/>
+            <a:ext cx="12919806" cy="9534661"/>
           </a:xfrm>
           <a:prstGeom prst="rect">
             <a:avLst/>
@@ -9100,25 +9226,7 @@
                 <a:ea typeface="DengXian" panose="02010600030101010101" pitchFamily="2" charset="-122"/>
                 <a:cs typeface="Times New Roman" panose="02020603050405020304" pitchFamily="18" charset="0"/>
               </a:rPr>
-              <a:t>] for the DISFA database. Symptom severity was assessed using the PANSS scale. Functional MRI and heart rate (HR) were recorded during viewing. The fMRI data has </a:t>
-            </a:r>
-            <a:r>
-              <a:rPr lang="en-AU" kern="100" dirty="0" err="1">
-                <a:effectLst/>
-                <a:latin typeface="+mn-lt"/>
-                <a:ea typeface="DengXian" panose="02010600030101010101" pitchFamily="2" charset="-122"/>
-                <a:cs typeface="Times New Roman" panose="02020603050405020304" pitchFamily="18" charset="0"/>
-              </a:rPr>
-              <a:t>previousely</a:t>
-            </a:r>
-            <a:r>
-              <a:rPr lang="en-AU" kern="100" dirty="0">
-                <a:effectLst/>
-                <a:latin typeface="+mn-lt"/>
-                <a:ea typeface="DengXian" panose="02010600030101010101" pitchFamily="2" charset="-122"/>
-                <a:cs typeface="Times New Roman" panose="02020603050405020304" pitchFamily="18" charset="0"/>
-              </a:rPr>
-              <a:t> been </a:t>
+              <a:t>] for the DISFA database. Symptom severity was assessed using the PANSS scale. Functional MRI and heart rate (HR) were recorded during viewing. The fMRI data has previously been </a:t>
             </a:r>
             <a:r>
               <a:rPr lang="en-AU" kern="100" dirty="0" err="1">
@@ -9221,7 +9329,16 @@
                 <a:ea typeface="Aptos" panose="020B0004020202020204" pitchFamily="34" charset="0"/>
                 <a:cs typeface="Times New Roman" panose="02020603050405020304" pitchFamily="18" charset="0"/>
               </a:rPr>
-              <a:t> </a:t>
+              <a:t> fMRI scans were parcellated using the Yeo 17 thick atlas [11]. </a:t>
+            </a:r>
+            <a:r>
+              <a:rPr lang="en-US" kern="100" dirty="0">
+                <a:effectLst/>
+                <a:latin typeface="+mn-lt"/>
+                <a:ea typeface="Aptos" panose="020B0004020202020204" pitchFamily="34" charset="0"/>
+                <a:cs typeface="Times New Roman" panose="02020603050405020304" pitchFamily="18" charset="0"/>
+              </a:rPr>
+              <a:t>We </a:t>
             </a:r>
             <a:r>
               <a:rPr lang="en-US" kern="100" dirty="0">
@@ -9233,7 +9350,28 @@
                 <a:ea typeface="Aptos" panose="020B0004020202020204" pitchFamily="34" charset="0"/>
                 <a:cs typeface="Times New Roman" panose="02020603050405020304" pitchFamily="18" charset="0"/>
               </a:rPr>
-              <a:t>We utilized a hidden Markov model (HMM) to identify underlying brain states driven by the stimuli via the OHBM HMM-MAR toolbox [11]. Parameters K (9</a:t>
+              <a:t>utilized a hidden Markov model (HMM) to identify underlying brain states driven by the stimuli via the OHBM HMM-MAR toolbox </a:t>
+            </a:r>
+            <a:r>
+              <a:rPr lang="en-US" kern="100" dirty="0">
+                <a:effectLst/>
+                <a:latin typeface="+mn-lt"/>
+                <a:ea typeface="Aptos" panose="020B0004020202020204" pitchFamily="34" charset="0"/>
+                <a:cs typeface="Times New Roman" panose="02020603050405020304" pitchFamily="18" charset="0"/>
+              </a:rPr>
+              <a:t>[12]. </a:t>
+            </a:r>
+            <a:r>
+              <a:rPr lang="en-US" kern="100" dirty="0">
+                <a:solidFill>
+                  <a:srgbClr val="000000"/>
+                </a:solidFill>
+                <a:effectLst/>
+                <a:latin typeface="+mn-lt"/>
+                <a:ea typeface="Aptos" panose="020B0004020202020204" pitchFamily="34" charset="0"/>
+                <a:cs typeface="Times New Roman" panose="02020603050405020304" pitchFamily="18" charset="0"/>
+              </a:rPr>
+              <a:t>Parameters K (9</a:t>
             </a:r>
             <a:r>
               <a:rPr lang="en-US" kern="100" dirty="0">

</xml_diff>